<commit_message>
Added - Missing Examples in (Charts, Loading, Saving and Converting)Section
</commit_message>
<xml_diff>
--- a/Examples/CSharp/ProgrammersGuide/Charts/Data/ExistingChart.pptx
+++ b/Examples/CSharp/ProgrammersGuide/Charts/Data/ExistingChart.pptx
@@ -1,7 +1,6 @@
 
 <file path=ppt/presentation.xml><?xml version="1.0" encoding="utf-8"?>
-<!--Generated by Aspose.Slides for .NET 14.1.2.0-->
-<p:presentation xmlns:r="http://schemas.openxmlformats.org/officeDocument/2006/relationships" xmlns:a="http://schemas.openxmlformats.org/drawingml/2006/main" xmlns:p="http://schemas.openxmlformats.org/presentationml/2006/main" saveSubsetFonts="1">
+<p:presentation xmlns:a="http://schemas.openxmlformats.org/drawingml/2006/main" xmlns:r="http://schemas.openxmlformats.org/officeDocument/2006/relationships" xmlns:p="http://schemas.openxmlformats.org/presentationml/2006/main" saveSubsetFonts="1">
   <p:sldMasterIdLst>
     <p:sldMasterId id="2147483648" r:id="rId1"/>
   </p:sldMasterIdLst>
@@ -108,13 +107,29 @@
       </a:defRPr>
     </a:lvl9pPr>
   </p:defaultTextStyle>
+  <p:extLst>
+    <p:ext uri="{EFAFB233-063F-42B5-8137-9DF3F51BA10A}">
+      <p15:sldGuideLst xmlns:p15="http://schemas.microsoft.com/office/powerpoint/2012/main">
+        <p15:guide id="1" orient="horz" pos="2160">
+          <p15:clr>
+            <a:srgbClr val="A4A3A4"/>
+          </p15:clr>
+        </p15:guide>
+        <p15:guide id="2" pos="2880">
+          <p15:clr>
+            <a:srgbClr val="A4A3A4"/>
+          </p15:clr>
+        </p15:guide>
+      </p15:sldGuideLst>
+    </p:ext>
+  </p:extLst>
 </p:presentation>
 </file>
 
 <file path=ppt/charts/chart1.xml><?xml version="1.0" encoding="utf-8"?>
-<c:chartSpace xmlns:a="http://schemas.openxmlformats.org/drawingml/2006/main" xmlns:r="http://schemas.openxmlformats.org/officeDocument/2006/relationships" xmlns:c="http://schemas.openxmlformats.org/drawingml/2006/chart">
+<c:chartSpace xmlns:c="http://schemas.openxmlformats.org/drawingml/2006/chart" xmlns:a="http://schemas.openxmlformats.org/drawingml/2006/main" xmlns:r="http://schemas.openxmlformats.org/officeDocument/2006/relationships">
   <c:date1904 val="0"/>
-  <c:lang val="ru-RU"/>
+  <c:lang val="en-US"/>
   <c:roundedCorners val="0"/>
   <mc:AlternateContent xmlns:mc="http://schemas.openxmlformats.org/markup-compatibility/2006">
     <mc:Choice xmlns:c14="http://schemas.microsoft.com/office/drawing/2007/8/2/chart" Requires="c14">
@@ -135,20 +150,18 @@
               <a:defRPr/>
             </a:pPr>
             <a:r>
+              <a:rPr lang="en-US"/>
               <a:t>Sample Title</a:t>
             </a:r>
           </a:p>
         </c:rich>
       </c:tx>
-      <c:layout>
-        <c:manualLayout>
-          <c:h val="20"/>
-        </c:manualLayout>
-      </c:layout>
+      <c:layout/>
       <c:overlay val="1"/>
     </c:title>
     <c:autoTitleDeleted val="0"/>
     <c:plotArea>
+      <c:layout/>
       <c:barChart>
         <c:barDir val="col"/>
         <c:grouping val="clustered"/>
@@ -232,24 +245,37 @@
           <c:dLbls>
             <c:dLbl>
               <c:idx val="0"/>
+              <c:layout/>
               <c:showLegendKey val="0"/>
               <c:showVal val="0"/>
               <c:showCatName val="1"/>
               <c:showSerName val="0"/>
               <c:showPercent val="0"/>
               <c:showBubbleSize val="0"/>
+              <c:extLst>
+                <c:ext xmlns:c15="http://schemas.microsoft.com/office/drawing/2012/chart" uri="{CE6537A1-D6FC-4f65-9D91-7224C49458BB}">
+                  <c15:layout/>
+                </c:ext>
+              </c:extLst>
             </c:dLbl>
             <c:dLbl>
               <c:idx val="1"/>
+              <c:layout/>
               <c:showLegendKey val="0"/>
               <c:showVal val="0"/>
               <c:showCatName val="0"/>
               <c:showSerName val="1"/>
               <c:showPercent val="0"/>
               <c:showBubbleSize val="0"/>
+              <c:extLst>
+                <c:ext xmlns:c15="http://schemas.microsoft.com/office/drawing/2012/chart" uri="{CE6537A1-D6FC-4f65-9D91-7224C49458BB}">
+                  <c15:layout/>
+                </c:ext>
+              </c:extLst>
             </c:dLbl>
             <c:dLbl>
               <c:idx val="2"/>
+              <c:layout/>
               <c:showLegendKey val="0"/>
               <c:showVal val="1"/>
               <c:showCatName val="0"/>
@@ -257,8 +283,30 @@
               <c:showPercent val="0"/>
               <c:showBubbleSize val="0"/>
               <c:separator>/</c:separator>
+              <c:extLst>
+                <c:ext xmlns:c15="http://schemas.microsoft.com/office/drawing/2012/chart" uri="{CE6537A1-D6FC-4f65-9D91-7224C49458BB}">
+                  <c15:layout/>
+                </c:ext>
+              </c:extLst>
             </c:dLbl>
-            <c:delete val="1"/>
+            <c:spPr>
+              <a:noFill/>
+              <a:ln>
+                <a:noFill/>
+              </a:ln>
+              <a:effectLst/>
+            </c:spPr>
+            <c:showLegendKey val="0"/>
+            <c:showVal val="0"/>
+            <c:showCatName val="0"/>
+            <c:showSerName val="0"/>
+            <c:showPercent val="0"/>
+            <c:showBubbleSize val="0"/>
+            <c:extLst>
+              <c:ext xmlns:c15="http://schemas.microsoft.com/office/drawing/2012/chart" uri="{CE6537A1-D6FC-4f65-9D91-7224C49458BB}">
+                <c15:showLeaderLines val="1"/>
+              </c:ext>
+            </c:extLst>
           </c:dLbls>
           <c:cat>
             <c:strRef>
@@ -303,34 +351,33 @@
           <c:showSerName val="0"/>
           <c:showPercent val="0"/>
           <c:showBubbleSize val="0"/>
-          <c:showLeaderLines val="0"/>
         </c:dLbls>
-        <c:gapWidth/>
-        <c:overlap/>
-        <c:axId val="67451136"/>
-        <c:axId val="66437120"/>
+        <c:gapWidth val="150"/>
+        <c:axId val="58876720"/>
+        <c:axId val="58877280"/>
       </c:barChart>
       <c:catAx>
-        <c:axId val="67451136"/>
+        <c:axId val="58876720"/>
         <c:scaling>
-          <c:orientation/>
+          <c:orientation val="minMax"/>
         </c:scaling>
         <c:delete val="0"/>
         <c:axPos val="b"/>
         <c:numFmt formatCode="General" sourceLinked="1"/>
         <c:majorTickMark val="out"/>
         <c:minorTickMark val="none"/>
-        <c:crossAx val="66437120"/>
+        <c:tickLblPos val="nextTo"/>
+        <c:crossAx val="58877280"/>
         <c:crosses val="autoZero"/>
         <c:auto val="0"/>
         <c:lblAlgn val="ctr"/>
-        <c:lblOffset/>
+        <c:lblOffset val="100"/>
         <c:noMultiLvlLbl val="0"/>
       </c:catAx>
       <c:valAx>
-        <c:axId val="66437120"/>
+        <c:axId val="58877280"/>
         <c:scaling>
-          <c:orientation/>
+          <c:orientation val="minMax"/>
         </c:scaling>
         <c:delete val="0"/>
         <c:axPos val="l"/>
@@ -338,29 +385,34 @@
         <c:numFmt formatCode="General" sourceLinked="1"/>
         <c:majorTickMark val="out"/>
         <c:minorTickMark val="none"/>
-        <c:crossAx val="67451136"/>
+        <c:tickLblPos val="nextTo"/>
+        <c:crossAx val="58876720"/>
         <c:crosses val="autoZero"/>
         <c:crossBetween val="between"/>
       </c:valAx>
     </c:plotArea>
     <c:legend>
-      <c:legendPos/>
+      <c:legendPos val="r"/>
+      <c:layout/>
       <c:overlay val="0"/>
     </c:legend>
     <c:plotVisOnly val="1"/>
-    <c:dispBlanksAs/>
+    <c:dispBlanksAs val="zero"/>
     <c:showDLblsOverMax val="1"/>
   </c:chart>
   <c:txPr>
     <a:bodyPr/>
+    <a:lstStyle/>
     <a:p>
       <a:pPr>
         <a:defRPr sz="1800"/>
       </a:pPr>
-      <a:endParaRPr lang="ru-RU"/>
+      <a:endParaRPr lang="en-US"/>
     </a:p>
   </c:txPr>
-  <c:externalData r:id="rId1"/>
+  <c:externalData r:id="rId1">
+    <c:autoUpdate val="0"/>
+  </c:externalData>
 </c:chartSpace>
 </file>
 
@@ -545,7 +597,7 @@
           <a:p>
             <a:fld id="{E8FD0B7A-F5DD-4F40-B4CB-3B2C354B893A}" type="datetimeFigureOut">
               <a:rPr lang="en-US" smtClean="0"/>
-              <a:t>11/7/2009</a:t>
+              <a:t>5/26/2016</a:t>
             </a:fld>
             <a:endParaRPr lang="en-US"/>
           </a:p>
@@ -718,7 +770,7 @@
           <a:p>
             <a:fld id="{E8FD0B7A-F5DD-4F40-B4CB-3B2C354B893A}" type="datetimeFigureOut">
               <a:rPr lang="en-US" smtClean="0"/>
-              <a:t>11/7/2009</a:t>
+              <a:t>5/26/2016</a:t>
             </a:fld>
             <a:endParaRPr lang="en-US"/>
           </a:p>
@@ -901,7 +953,7 @@
           <a:p>
             <a:fld id="{E8FD0B7A-F5DD-4F40-B4CB-3B2C354B893A}" type="datetimeFigureOut">
               <a:rPr lang="en-US" smtClean="0"/>
-              <a:t>11/7/2009</a:t>
+              <a:t>5/26/2016</a:t>
             </a:fld>
             <a:endParaRPr lang="en-US"/>
           </a:p>
@@ -1074,7 +1126,7 @@
           <a:p>
             <a:fld id="{E8FD0B7A-F5DD-4F40-B4CB-3B2C354B893A}" type="datetimeFigureOut">
               <a:rPr lang="en-US" smtClean="0"/>
-              <a:t>11/7/2009</a:t>
+              <a:t>5/26/2016</a:t>
             </a:fld>
             <a:endParaRPr lang="en-US"/>
           </a:p>
@@ -1323,7 +1375,7 @@
           <a:p>
             <a:fld id="{E8FD0B7A-F5DD-4F40-B4CB-3B2C354B893A}" type="datetimeFigureOut">
               <a:rPr lang="en-US" smtClean="0"/>
-              <a:t>11/7/2009</a:t>
+              <a:t>5/26/2016</a:t>
             </a:fld>
             <a:endParaRPr lang="en-US"/>
           </a:p>
@@ -1614,7 +1666,7 @@
           <a:p>
             <a:fld id="{E8FD0B7A-F5DD-4F40-B4CB-3B2C354B893A}" type="datetimeFigureOut">
               <a:rPr lang="en-US" smtClean="0"/>
-              <a:t>11/7/2009</a:t>
+              <a:t>5/26/2016</a:t>
             </a:fld>
             <a:endParaRPr lang="en-US"/>
           </a:p>
@@ -2035,7 +2087,7 @@
           <a:p>
             <a:fld id="{E8FD0B7A-F5DD-4F40-B4CB-3B2C354B893A}" type="datetimeFigureOut">
               <a:rPr lang="en-US" smtClean="0"/>
-              <a:t>11/7/2009</a:t>
+              <a:t>5/26/2016</a:t>
             </a:fld>
             <a:endParaRPr lang="en-US"/>
           </a:p>
@@ -2156,7 +2208,7 @@
           <a:p>
             <a:fld id="{E8FD0B7A-F5DD-4F40-B4CB-3B2C354B893A}" type="datetimeFigureOut">
               <a:rPr lang="en-US" smtClean="0"/>
-              <a:t>11/7/2009</a:t>
+              <a:t>5/26/2016</a:t>
             </a:fld>
             <a:endParaRPr lang="en-US"/>
           </a:p>
@@ -2254,7 +2306,7 @@
           <a:p>
             <a:fld id="{E8FD0B7A-F5DD-4F40-B4CB-3B2C354B893A}" type="datetimeFigureOut">
               <a:rPr lang="en-US" smtClean="0"/>
-              <a:t>11/7/2009</a:t>
+              <a:t>5/26/2016</a:t>
             </a:fld>
             <a:endParaRPr lang="en-US"/>
           </a:p>
@@ -2534,7 +2586,7 @@
           <a:p>
             <a:fld id="{E8FD0B7A-F5DD-4F40-B4CB-3B2C354B893A}" type="datetimeFigureOut">
               <a:rPr lang="en-US" smtClean="0"/>
-              <a:t>11/7/2009</a:t>
+              <a:t>5/26/2016</a:t>
             </a:fld>
             <a:endParaRPr lang="en-US"/>
           </a:p>
@@ -2790,7 +2842,7 @@
           <a:p>
             <a:fld id="{E8FD0B7A-F5DD-4F40-B4CB-3B2C354B893A}" type="datetimeFigureOut">
               <a:rPr lang="en-US" smtClean="0"/>
-              <a:t>11/7/2009</a:t>
+              <a:t>5/26/2016</a:t>
             </a:fld>
             <a:endParaRPr lang="en-US"/>
           </a:p>
@@ -2856,7 +2908,7 @@
 
 <file path=ppt/slideMasters/slideMaster1.xml><?xml version="1.0" encoding="utf-8"?>
 <p:sldMaster xmlns:a="http://schemas.openxmlformats.org/drawingml/2006/main" xmlns:r="http://schemas.openxmlformats.org/officeDocument/2006/relationships" xmlns:p="http://schemas.openxmlformats.org/presentationml/2006/main">
-  <p:cSld name="">
+  <p:cSld>
     <p:bg>
       <p:bgRef idx="1001">
         <a:schemeClr val="bg1"/>
@@ -3006,7 +3058,7 @@
           <a:p>
             <a:fld id="{E8FD0B7A-F5DD-4F40-B4CB-3B2C354B893A}" type="datetimeFigureOut">
               <a:rPr lang="en-US" smtClean="0"/>
-              <a:t>11/7/2009</a:t>
+              <a:t>5/26/2016</a:t>
             </a:fld>
             <a:endParaRPr lang="en-US"/>
           </a:p>
@@ -3369,7 +3421,7 @@
 
 <file path=ppt/slides/slide1.xml><?xml version="1.0" encoding="utf-8"?>
 <p:sld xmlns:a="http://schemas.openxmlformats.org/drawingml/2006/main" xmlns:r="http://schemas.openxmlformats.org/officeDocument/2006/relationships" xmlns:p="http://schemas.openxmlformats.org/presentationml/2006/main">
-  <p:cSld name="">
+  <p:cSld>
     <p:spTree>
       <p:nvGrpSpPr>
         <p:cNvPr id="1" name=""/>
@@ -3386,7 +3438,7 @@
       </p:grpSpPr>
       <p:graphicFrame>
         <p:nvGraphicFramePr>
-          <p:cNvPr id="2" name="ChartObject" descr=""/>
+          <p:cNvPr id="2" name="ChartObject"/>
           <p:cNvGraphicFramePr/>
           <p:nvPr/>
         </p:nvGraphicFramePr>
@@ -3396,7 +3448,7 @@
         </p:xfrm>
         <a:graphic>
           <a:graphicData uri="http://schemas.openxmlformats.org/drawingml/2006/chart">
-            <c:chart xmlns:c="http://schemas.openxmlformats.org/drawingml/2006/chart" r:id="rId2"/>
+            <c:chart xmlns:c="http://schemas.openxmlformats.org/drawingml/2006/chart" xmlns:r="http://schemas.openxmlformats.org/officeDocument/2006/relationships" r:id="rId2"/>
           </a:graphicData>
         </a:graphic>
       </p:graphicFrame>
@@ -3410,8 +3462,8 @@
         </p:nvSpPr>
         <p:spPr>
           <a:xfrm>
-            <a:off x="1366520" y="2644140"/>
-            <a:ext cx="6411372" cy="1569660"/>
+            <a:off x="4479841" y="3051623"/>
+            <a:ext cx="184730" cy="754694"/>
           </a:xfrm>
           <a:prstGeom prst="rect">
             <a:avLst/>
@@ -3453,21 +3505,33 @@
           </a:lstStyle>
           <a:p>
             <a:pPr algn="ctr"/>
-            <a:r>
-              <a:t>Evaluation only.</a:t>
-            </a:r>
-          </a:p>
-          <a:p>
-            <a:pPr algn="ctr"/>
-            <a:r>
-              <a:t>Created with Aspose.Slides for .NET 2.0 14.1.2.0</a:t>
-            </a:r>
-          </a:p>
-          <a:p>
-            <a:pPr algn="ctr"/>
-            <a:r>
-              <a:t>Copyright 2004-2014 Aspose Pty Ltd.</a:t>
-            </a:r>
+            <a:endParaRPr dirty="0"/>
+          </a:p>
+        </p:txBody>
+      </p:sp>
+      <p:sp>
+        <p:nvSpPr>
+          <p:cNvPr id="4" name="TextBox 3"/>
+          <p:cNvSpPr txBox="1"/>
+          <p:nvPr/>
+        </p:nvSpPr>
+        <p:spPr>
+          <a:xfrm>
+            <a:off x="7524328" y="3501008"/>
+            <a:ext cx="184731" cy="369332"/>
+          </a:xfrm>
+          <a:prstGeom prst="rect">
+            <a:avLst/>
+          </a:prstGeom>
+          <a:noFill/>
+        </p:spPr>
+        <p:txBody>
+          <a:bodyPr wrap="none" rtlCol="0">
+            <a:spAutoFit/>
+          </a:bodyPr>
+          <a:lstStyle/>
+          <a:p>
+            <a:endParaRPr lang="en-US" dirty="0"/>
           </a:p>
         </p:txBody>
       </p:sp>
@@ -3488,7 +3552,7 @@
 </file>
 
 <file path=ppt/tags/tag1.xml><?xml version="1.0" encoding="utf-8"?>
-<p:tagLst xmlns:p="http://schemas.openxmlformats.org/presentationml/2006/main">
+<p:tagLst xmlns:a="http://schemas.openxmlformats.org/drawingml/2006/main" xmlns:r="http://schemas.openxmlformats.org/officeDocument/2006/relationships" xmlns:p="http://schemas.openxmlformats.org/presentationml/2006/main">
   <p:tag name="AS_NET" val="2.0.50727.5477"/>
   <p:tag name="AS_OS" val="Microsoft Windows NT 6.1.7601 Service Pack 1"/>
   <p:tag name="AS_RELEASE_DATE" val="2014.02.17"/>
@@ -3498,7 +3562,7 @@
 </file>
 
 <file path=ppt/theme/theme1.xml><?xml version="1.0" encoding="utf-8"?>
-<a:theme xmlns:r="http://schemas.openxmlformats.org/officeDocument/2006/relationships" xmlns:a="http://schemas.openxmlformats.org/drawingml/2006/main" name="Office Theme">
+<a:theme xmlns:a="http://schemas.openxmlformats.org/drawingml/2006/main" name="Office Theme">
   <a:themeElements>
     <a:clrScheme name="Office">
       <a:dk1>
@@ -3777,5 +3841,7 @@
       </a:bgFillStyleLst>
     </a:fmtScheme>
   </a:themeElements>
+  <a:objectDefaults/>
+  <a:extraClrSchemeLst/>
 </a:theme>
 </file>
</xml_diff>